<commit_message>
combined: add {abstract} notation to exercise
</commit_message>
<xml_diff>
--- a/diagrams/combined/ClassAndObjectDiagramAllNotations.pptx
+++ b/diagrams/combined/ClassAndObjectDiagramAllNotations.pptx
@@ -198,7 +198,7 @@
           <a:p>
             <a:fld id="{316F5B8D-864D-4899-A61D-BE4B09C9435F}" type="datetimeFigureOut">
               <a:rPr lang="en-US" smtClean="0"/>
-              <a:t>02-Sep-19</a:t>
+              <a:t>9/8/2019</a:t>
             </a:fld>
             <a:endParaRPr lang="en-US"/>
           </a:p>
@@ -743,7 +743,7 @@
           <a:p>
             <a:fld id="{DFEBCACD-CC1D-410F-84F6-B4A6524FFB0C}" type="datetimeFigureOut">
               <a:rPr lang="en-US" smtClean="0"/>
-              <a:t>02-Sep-19</a:t>
+              <a:t>9/8/2019</a:t>
             </a:fld>
             <a:endParaRPr lang="en-US"/>
           </a:p>
@@ -913,7 +913,7 @@
           <a:p>
             <a:fld id="{DFEBCACD-CC1D-410F-84F6-B4A6524FFB0C}" type="datetimeFigureOut">
               <a:rPr lang="en-US" smtClean="0"/>
-              <a:t>02-Sep-19</a:t>
+              <a:t>9/8/2019</a:t>
             </a:fld>
             <a:endParaRPr lang="en-US"/>
           </a:p>
@@ -1093,7 +1093,7 @@
           <a:p>
             <a:fld id="{DFEBCACD-CC1D-410F-84F6-B4A6524FFB0C}" type="datetimeFigureOut">
               <a:rPr lang="en-US" smtClean="0"/>
-              <a:t>02-Sep-19</a:t>
+              <a:t>9/8/2019</a:t>
             </a:fld>
             <a:endParaRPr lang="en-US"/>
           </a:p>
@@ -1263,7 +1263,7 @@
           <a:p>
             <a:fld id="{DFEBCACD-CC1D-410F-84F6-B4A6524FFB0C}" type="datetimeFigureOut">
               <a:rPr lang="en-US" smtClean="0"/>
-              <a:t>02-Sep-19</a:t>
+              <a:t>9/8/2019</a:t>
             </a:fld>
             <a:endParaRPr lang="en-US"/>
           </a:p>
@@ -1509,7 +1509,7 @@
           <a:p>
             <a:fld id="{DFEBCACD-CC1D-410F-84F6-B4A6524FFB0C}" type="datetimeFigureOut">
               <a:rPr lang="en-US" smtClean="0"/>
-              <a:t>02-Sep-19</a:t>
+              <a:t>9/8/2019</a:t>
             </a:fld>
             <a:endParaRPr lang="en-US"/>
           </a:p>
@@ -1741,7 +1741,7 @@
           <a:p>
             <a:fld id="{DFEBCACD-CC1D-410F-84F6-B4A6524FFB0C}" type="datetimeFigureOut">
               <a:rPr lang="en-US" smtClean="0"/>
-              <a:t>02-Sep-19</a:t>
+              <a:t>9/8/2019</a:t>
             </a:fld>
             <a:endParaRPr lang="en-US"/>
           </a:p>
@@ -2108,7 +2108,7 @@
           <a:p>
             <a:fld id="{DFEBCACD-CC1D-410F-84F6-B4A6524FFB0C}" type="datetimeFigureOut">
               <a:rPr lang="en-US" smtClean="0"/>
-              <a:t>02-Sep-19</a:t>
+              <a:t>9/8/2019</a:t>
             </a:fld>
             <a:endParaRPr lang="en-US"/>
           </a:p>
@@ -2226,7 +2226,7 @@
           <a:p>
             <a:fld id="{DFEBCACD-CC1D-410F-84F6-B4A6524FFB0C}" type="datetimeFigureOut">
               <a:rPr lang="en-US" smtClean="0"/>
-              <a:t>02-Sep-19</a:t>
+              <a:t>9/8/2019</a:t>
             </a:fld>
             <a:endParaRPr lang="en-US"/>
           </a:p>
@@ -2321,7 +2321,7 @@
           <a:p>
             <a:fld id="{DFEBCACD-CC1D-410F-84F6-B4A6524FFB0C}" type="datetimeFigureOut">
               <a:rPr lang="en-US" smtClean="0"/>
-              <a:t>02-Sep-19</a:t>
+              <a:t>9/8/2019</a:t>
             </a:fld>
             <a:endParaRPr lang="en-US"/>
           </a:p>
@@ -2598,7 +2598,7 @@
           <a:p>
             <a:fld id="{DFEBCACD-CC1D-410F-84F6-B4A6524FFB0C}" type="datetimeFigureOut">
               <a:rPr lang="en-US" smtClean="0"/>
-              <a:t>02-Sep-19</a:t>
+              <a:t>9/8/2019</a:t>
             </a:fld>
             <a:endParaRPr lang="en-US"/>
           </a:p>
@@ -2851,7 +2851,7 @@
           <a:p>
             <a:fld id="{DFEBCACD-CC1D-410F-84F6-B4A6524FFB0C}" type="datetimeFigureOut">
               <a:rPr lang="en-US" smtClean="0"/>
-              <a:t>02-Sep-19</a:t>
+              <a:t>9/8/2019</a:t>
             </a:fld>
             <a:endParaRPr lang="en-US"/>
           </a:p>
@@ -3064,7 +3064,7 @@
           <a:p>
             <a:fld id="{DFEBCACD-CC1D-410F-84F6-B4A6524FFB0C}" type="datetimeFigureOut">
               <a:rPr lang="en-US" smtClean="0"/>
-              <a:t>02-Sep-19</a:t>
+              <a:t>9/8/2019</a:t>
             </a:fld>
             <a:endParaRPr lang="en-US"/>
           </a:p>
@@ -3469,30 +3469,6 @@
           <a:chExt cx="0" cy="0"/>
         </a:xfrm>
       </p:grpSpPr>
-      <p:sp>
-        <p:nvSpPr>
-          <p:cNvPr id="2" name="Title 1"/>
-          <p:cNvSpPr>
-            <a:spLocks noGrp="1"/>
-          </p:cNvSpPr>
-          <p:nvPr>
-            <p:ph type="title"/>
-          </p:nvPr>
-        </p:nvSpPr>
-        <p:spPr>
-          <a:xfrm>
-            <a:off x="2039566" y="-1143000"/>
-            <a:ext cx="8229600" cy="1143000"/>
-          </a:xfrm>
-        </p:spPr>
-        <p:txBody>
-          <a:bodyPr/>
-          <a:lstStyle/>
-          <a:p>
-            <a:endParaRPr lang="en-SG" dirty="0"/>
-          </a:p>
-        </p:txBody>
-      </p:sp>
       <p:grpSp>
         <p:nvGrpSpPr>
           <p:cNvPr id="3" name="Group 23"/>
@@ -5109,10 +5085,10 @@
         </p:nvGrpSpPr>
         <p:grpSpPr>
           <a:xfrm>
-            <a:off x="2567637" y="167403"/>
-            <a:ext cx="2202325" cy="1476841"/>
-            <a:chOff x="6180466" y="854879"/>
-            <a:chExt cx="1256654" cy="1476841"/>
+            <a:off x="2567637" y="-97725"/>
+            <a:ext cx="3153145" cy="1741969"/>
+            <a:chOff x="6180466" y="589751"/>
+            <a:chExt cx="1256654" cy="1741969"/>
           </a:xfrm>
           <a:solidFill>
             <a:schemeClr val="bg1">
@@ -5128,8 +5104,8 @@
           </p:nvSpPr>
           <p:spPr>
             <a:xfrm>
-              <a:off x="6180466" y="854879"/>
-              <a:ext cx="1256654" cy="386944"/>
+              <a:off x="6180466" y="589751"/>
+              <a:ext cx="1256654" cy="652072"/>
             </a:xfrm>
             <a:prstGeom prst="rect">
               <a:avLst/>
@@ -5158,7 +5134,19 @@
             <a:p>
               <a:pPr algn="ctr"/>
               <a:r>
-                <a:rPr lang="en-US" b="1" dirty="0">
+                <a:rPr lang="en-US" b="1" dirty="0" smtClean="0">
+                  <a:solidFill>
+                    <a:schemeClr val="bg1"/>
+                  </a:solidFill>
+                  <a:latin typeface="Calibri"/>
+                </a:rPr>
+                <a:t>{abstract}</a:t>
+              </a:r>
+            </a:p>
+            <a:p>
+              <a:pPr algn="ctr"/>
+              <a:r>
+                <a:rPr lang="en-US" b="1" dirty="0" smtClean="0">
                   <a:solidFill>
                     <a:schemeClr val="bg1"/>
                   </a:solidFill>
@@ -5340,6 +5328,33 @@
                   <a:latin typeface="Calibri"/>
                 </a:rPr>
                 <a:t>int</a:t>
+              </a:r>
+              <a:r>
+                <a:rPr lang="en-SG" b="1" dirty="0" smtClean="0">
+                  <a:solidFill>
+                    <a:schemeClr val="bg1"/>
+                  </a:solidFill>
+                  <a:latin typeface="Calibri"/>
+                </a:rPr>
+                <a:t> {</a:t>
+              </a:r>
+              <a:r>
+                <a:rPr lang="en-SG" b="1" dirty="0" err="1" smtClean="0">
+                  <a:solidFill>
+                    <a:schemeClr val="bg1"/>
+                  </a:solidFill>
+                  <a:latin typeface="Calibri"/>
+                </a:rPr>
+                <a:t>abastract</a:t>
+              </a:r>
+              <a:r>
+                <a:rPr lang="en-SG" b="1" dirty="0" smtClean="0">
+                  <a:solidFill>
+                    <a:schemeClr val="bg1"/>
+                  </a:solidFill>
+                  <a:latin typeface="Calibri"/>
+                </a:rPr>
+                <a:t>}</a:t>
               </a:r>
               <a:endParaRPr lang="en-SG" b="1" dirty="0">
                 <a:solidFill>
@@ -7135,16 +7150,7 @@
                 </a:solidFill>
                 <a:latin typeface="Calibri"/>
               </a:rPr>
-              <a:t>c</a:t>
-            </a:r>
-            <a:r>
-              <a:rPr lang="en-US" b="1" u="sng" dirty="0" smtClean="0">
-                <a:solidFill>
-                  <a:prstClr val="white"/>
-                </a:solidFill>
-                <a:latin typeface="Calibri"/>
-              </a:rPr>
-              <a:t>1:Chapter</a:t>
+              <a:t>c1:Chapter</a:t>
             </a:r>
             <a:endParaRPr lang="en-SG" b="1" u="sng" dirty="0">
               <a:solidFill>

</xml_diff>